<commit_message>
[CYS] word 기획서 추가, ppt 수정
</commit_message>
<xml_diff>
--- a/대충 설계도.pptx
+++ b/대충 설계도.pptx
@@ -118,6 +118,9 @@
     <p:ext uri="{EFAFB233-063F-42B5-8137-9DF3F51BA10A}">
       <p15:sldGuideLst xmlns:p15="http://schemas.microsoft.com/office/powerpoint/2012/main"/>
     </p:ext>
+    <p:ext uri="{2D200454-40CA-4A62-9FC3-DE9A4176ACB9}">
+      <p15:notesGuideLst xmlns:p15="http://schemas.microsoft.com/office/powerpoint/2012/main"/>
+    </p:ext>
   </p:extLst>
 </p:presentation>
 </file>
@@ -204,7 +207,7 @@
           <a:p>
             <a:fld id="{74C9A701-BECF-4E66-B1A9-0DDE51DF3C32}" type="datetimeFigureOut">
               <a:rPr lang="ko-KR" altLang="en-US" smtClean="0"/>
-              <a:t>2024-03-19</a:t>
+              <a:t>2024-03-20</a:t>
             </a:fld>
             <a:endParaRPr lang="ko-KR" altLang="en-US"/>
           </a:p>
@@ -369,7 +372,7 @@
           <a:p>
             <a:fld id="{AFF4EA0E-EAAE-4D3F-AFB4-8B0347A13ED6}" type="datetimeFigureOut">
               <a:rPr lang="ko-KR" altLang="en-US" smtClean="0"/>
-              <a:t>2024-03-19</a:t>
+              <a:t>2024-03-20</a:t>
             </a:fld>
             <a:endParaRPr lang="ko-KR" altLang="en-US"/>
           </a:p>
@@ -768,7 +771,7 @@
           <a:p>
             <a:fld id="{DF3A7121-52D7-45D7-83AA-4372C345CB62}" type="datetime1">
               <a:rPr lang="ko-KR" altLang="en-US" smtClean="0"/>
-              <a:t>2024-03-19</a:t>
+              <a:t>2024-03-20</a:t>
             </a:fld>
             <a:endParaRPr lang="ko-KR" altLang="en-US" dirty="0"/>
           </a:p>
@@ -953,7 +956,7 @@
           <a:p>
             <a:fld id="{92AA6529-A132-4E5C-83A0-D1099610F41A}" type="datetime1">
               <a:rPr lang="ko-KR" altLang="en-US" smtClean="0"/>
-              <a:t>2024-03-19</a:t>
+              <a:t>2024-03-20</a:t>
             </a:fld>
             <a:endParaRPr lang="ko-KR" altLang="en-US"/>
           </a:p>
@@ -1148,7 +1151,7 @@
           <a:p>
             <a:fld id="{239936F7-CC86-4EBF-89EF-4F8C3793C16C}" type="datetime1">
               <a:rPr lang="ko-KR" altLang="en-US" smtClean="0"/>
-              <a:t>2024-03-19</a:t>
+              <a:t>2024-03-20</a:t>
             </a:fld>
             <a:endParaRPr lang="ko-KR" altLang="en-US"/>
           </a:p>
@@ -1267,15 +1270,7 @@
           <a:p>
             <a:r>
               <a:rPr lang="ko-KR" altLang="en-US" dirty="0" smtClean="0"/>
-              <a:t>마스터 </a:t>
-            </a:r>
-            <a:r>
-              <a:rPr lang="ko-KR" altLang="en-US" dirty="0" smtClean="0"/>
-              <a:t>제목 스타일 </a:t>
-            </a:r>
-            <a:r>
-              <a:rPr lang="ko-KR" altLang="en-US" dirty="0" smtClean="0"/>
-              <a:t>편집</a:t>
+              <a:t>마스터 제목 스타일 편집</a:t>
             </a:r>
             <a:endParaRPr lang="ko-KR" altLang="en-US" dirty="0"/>
           </a:p>
@@ -1306,11 +1301,7 @@
             <a:pPr lvl="1"/>
             <a:r>
               <a:rPr lang="ko-KR" altLang="en-US" dirty="0" smtClean="0"/>
-              <a:t>둘째 </a:t>
-            </a:r>
-            <a:r>
-              <a:rPr lang="ko-KR" altLang="en-US" dirty="0" smtClean="0"/>
-              <a:t>수준</a:t>
+              <a:t>둘째 수준</a:t>
             </a:r>
           </a:p>
           <a:p>
@@ -1354,7 +1345,7 @@
           <a:p>
             <a:fld id="{8324B3F8-367B-44E7-A104-2C7D7A6AB900}" type="datetime1">
               <a:rPr lang="ko-KR" altLang="en-US" smtClean="0"/>
-              <a:t>2024-03-19</a:t>
+              <a:t>2024-03-20</a:t>
             </a:fld>
             <a:endParaRPr lang="ko-KR" altLang="en-US"/>
           </a:p>
@@ -1625,7 +1616,7 @@
           <a:p>
             <a:fld id="{F089C6E7-2034-4B02-851D-36DFC26C3E9E}" type="datetime1">
               <a:rPr lang="ko-KR" altLang="en-US" smtClean="0"/>
-              <a:t>2024-03-19</a:t>
+              <a:t>2024-03-20</a:t>
             </a:fld>
             <a:endParaRPr lang="ko-KR" altLang="en-US"/>
           </a:p>
@@ -1872,7 +1863,7 @@
           <a:p>
             <a:fld id="{8C5694B5-1083-4023-B860-A7D6B60AECB0}" type="datetime1">
               <a:rPr lang="ko-KR" altLang="en-US" smtClean="0"/>
-              <a:t>2024-03-19</a:t>
+              <a:t>2024-03-20</a:t>
             </a:fld>
             <a:endParaRPr lang="ko-KR" altLang="en-US"/>
           </a:p>
@@ -2254,7 +2245,7 @@
           <a:p>
             <a:fld id="{86AE655F-91EA-4219-9715-7A7BD09C898E}" type="datetime1">
               <a:rPr lang="ko-KR" altLang="en-US" smtClean="0"/>
-              <a:t>2024-03-19</a:t>
+              <a:t>2024-03-20</a:t>
             </a:fld>
             <a:endParaRPr lang="ko-KR" altLang="en-US"/>
           </a:p>
@@ -2387,7 +2378,7 @@
           <a:p>
             <a:fld id="{66A73425-252E-4438-9174-228309ED25A6}" type="datetime1">
               <a:rPr lang="ko-KR" altLang="en-US" smtClean="0"/>
-              <a:t>2024-03-19</a:t>
+              <a:t>2024-03-20</a:t>
             </a:fld>
             <a:endParaRPr lang="ko-KR" altLang="en-US"/>
           </a:p>
@@ -2497,7 +2488,7 @@
           <a:p>
             <a:fld id="{96C653CF-8C6C-4115-A6B7-E92A27B09C35}" type="datetime1">
               <a:rPr lang="ko-KR" altLang="en-US" smtClean="0"/>
-              <a:t>2024-03-19</a:t>
+              <a:t>2024-03-20</a:t>
             </a:fld>
             <a:endParaRPr lang="ko-KR" altLang="en-US"/>
           </a:p>
@@ -2789,7 +2780,7 @@
           <a:p>
             <a:fld id="{FA2959EF-7AC9-40C5-B2E3-812567DC8B97}" type="datetime1">
               <a:rPr lang="ko-KR" altLang="en-US" smtClean="0"/>
-              <a:t>2024-03-19</a:t>
+              <a:t>2024-03-20</a:t>
             </a:fld>
             <a:endParaRPr lang="ko-KR" altLang="en-US"/>
           </a:p>
@@ -3057,7 +3048,7 @@
           <a:p>
             <a:fld id="{8E4358F6-550B-4AB7-B8E8-E889E97A6024}" type="datetime1">
               <a:rPr lang="ko-KR" altLang="en-US" smtClean="0"/>
-              <a:t>2024-03-19</a:t>
+              <a:t>2024-03-20</a:t>
             </a:fld>
             <a:endParaRPr lang="ko-KR" altLang="en-US"/>
           </a:p>
@@ -3285,7 +3276,7 @@
           <a:p>
             <a:fld id="{82796CD8-19CA-4A88-B539-DF9B58F792E5}" type="datetime1">
               <a:rPr lang="ko-KR" altLang="en-US" smtClean="0"/>
-              <a:t>2024-03-19</a:t>
+              <a:t>2024-03-20</a:t>
             </a:fld>
             <a:endParaRPr lang="ko-KR" altLang="en-US" dirty="0"/>
           </a:p>
@@ -3332,7 +3323,6 @@
               <a:rPr lang="ko-KR" altLang="en-US" dirty="0" smtClean="0"/>
               <a:t>최영수 앱 기획 자료</a:t>
             </a:r>
-            <a:endParaRPr lang="ko-KR" altLang="en-US" dirty="0" smtClean="0"/>
           </a:p>
         </p:txBody>
       </p:sp>
@@ -3854,6 +3844,39 @@
           <a:chExt cx="0" cy="0"/>
         </a:xfrm>
       </p:grpSpPr>
+      <p:pic>
+        <p:nvPicPr>
+          <p:cNvPr id="6" name="그림 5"/>
+          <p:cNvPicPr>
+            <a:picLocks noChangeAspect="1"/>
+          </p:cNvPicPr>
+          <p:nvPr/>
+        </p:nvPicPr>
+        <p:blipFill>
+          <a:blip r:embed="rId2" cstate="print">
+            <a:extLst>
+              <a:ext uri="{28A0092B-C50C-407E-A947-70E740481C1C}">
+                <a14:useLocalDpi xmlns:a14="http://schemas.microsoft.com/office/drawing/2010/main" val="0"/>
+              </a:ext>
+            </a:extLst>
+          </a:blip>
+          <a:stretch>
+            <a:fillRect/>
+          </a:stretch>
+        </p:blipFill>
+        <p:spPr>
+          <a:xfrm>
+            <a:off x="-692331" y="297225"/>
+            <a:ext cx="9841163" cy="6560775"/>
+          </a:xfrm>
+          <a:prstGeom prst="rect">
+            <a:avLst/>
+          </a:prstGeom>
+          <a:effectLst>
+            <a:softEdge rad="1270000"/>
+          </a:effectLst>
+        </p:spPr>
+      </p:pic>
       <p:sp>
         <p:nvSpPr>
           <p:cNvPr id="2" name="제목 1"/>
@@ -3864,7 +3887,12 @@
             <p:ph type="ctrTitle"/>
           </p:nvPr>
         </p:nvSpPr>
-        <p:spPr/>
+        <p:spPr>
+          <a:xfrm>
+            <a:off x="8153400" y="1043754"/>
+            <a:ext cx="4628606" cy="1171712"/>
+          </a:xfrm>
+        </p:spPr>
         <p:txBody>
           <a:bodyPr/>
           <a:lstStyle/>
@@ -3887,43 +3915,55 @@
             <p:ph type="subTitle" idx="1"/>
           </p:nvPr>
         </p:nvSpPr>
+        <p:spPr>
+          <a:xfrm>
+            <a:off x="7803762" y="3102381"/>
+            <a:ext cx="5327881" cy="1655762"/>
+          </a:xfrm>
+        </p:spPr>
+        <p:txBody>
+          <a:bodyPr/>
+          <a:lstStyle/>
+          <a:p>
+            <a:r>
+              <a:rPr lang="ko-KR" altLang="en-US" dirty="0" smtClean="0"/>
+              <a:t>개발 팀을 구하는</a:t>
+            </a:r>
+            <a:endParaRPr lang="en-US" altLang="ko-KR" dirty="0" smtClean="0"/>
+          </a:p>
+          <a:p>
+            <a:r>
+              <a:rPr lang="ko-KR" altLang="en-US" dirty="0" smtClean="0"/>
+              <a:t>가장 쉬운 방법</a:t>
+            </a:r>
+            <a:endParaRPr lang="ko-KR" altLang="en-US" dirty="0"/>
+          </a:p>
+        </p:txBody>
+      </p:sp>
+      <p:sp>
+        <p:nvSpPr>
+          <p:cNvPr id="4" name="바닥글 개체 틀 3"/>
+          <p:cNvSpPr>
+            <a:spLocks noGrp="1"/>
+          </p:cNvSpPr>
+          <p:nvPr>
+            <p:ph type="ftr" sz="quarter" idx="11"/>
+          </p:nvPr>
+        </p:nvSpPr>
         <p:spPr/>
         <p:txBody>
           <a:bodyPr/>
           <a:lstStyle/>
           <a:p>
             <a:r>
+              <a:rPr lang="en-US" altLang="ko-KR" dirty="0" smtClean="0"/>
+              <a:t>202034017 </a:t>
+            </a:r>
+            <a:r>
               <a:rPr lang="ko-KR" altLang="en-US" dirty="0" smtClean="0"/>
-              <a:t>컨셉을 한마디로 설명 할 수 있는 글</a:t>
+              <a:t>최영수 앱 기획 자료</a:t>
             </a:r>
             <a:endParaRPr lang="ko-KR" altLang="en-US" dirty="0"/>
-          </a:p>
-        </p:txBody>
-      </p:sp>
-      <p:sp>
-        <p:nvSpPr>
-          <p:cNvPr id="4" name="바닥글 개체 틀 3"/>
-          <p:cNvSpPr>
-            <a:spLocks noGrp="1"/>
-          </p:cNvSpPr>
-          <p:nvPr>
-            <p:ph type="ftr" sz="quarter" idx="11"/>
-          </p:nvPr>
-        </p:nvSpPr>
-        <p:spPr/>
-        <p:txBody>
-          <a:bodyPr/>
-          <a:lstStyle/>
-          <a:p>
-            <a:r>
-              <a:rPr lang="en-US" altLang="ko-KR" smtClean="0"/>
-              <a:t>202034017 </a:t>
-            </a:r>
-            <a:r>
-              <a:rPr lang="ko-KR" altLang="en-US" smtClean="0"/>
-              <a:t>최영수 앱 기획 자료</a:t>
-            </a:r>
-            <a:endParaRPr lang="ko-KR" altLang="en-US"/>
           </a:p>
         </p:txBody>
       </p:sp>
@@ -3973,6 +4013,17 @@
 <file path=ppt/slides/slide2.xml><?xml version="1.0" encoding="utf-8"?>
 <p:sld xmlns:a="http://schemas.openxmlformats.org/drawingml/2006/main" xmlns:r="http://schemas.openxmlformats.org/officeDocument/2006/relationships" xmlns:p="http://schemas.openxmlformats.org/presentationml/2006/main">
   <p:cSld>
+    <p:bg>
+      <p:bgPr>
+        <a:solidFill>
+          <a:schemeClr val="bg1">
+            <a:tint val="95000"/>
+            <a:satMod val="170000"/>
+          </a:schemeClr>
+        </a:solidFill>
+        <a:effectLst/>
+      </p:bgPr>
+    </p:bg>
     <p:spTree>
       <p:nvGrpSpPr>
         <p:cNvPr id="1" name=""/>
@@ -4313,18 +4364,7 @@
                   </a:schemeClr>
                 </a:solidFill>
               </a:rPr>
-              <a:t>앱 개발 </a:t>
-            </a:r>
-            <a:r>
-              <a:rPr lang="ko-KR" altLang="en-US" b="1" dirty="0" smtClean="0">
-                <a:solidFill>
-                  <a:schemeClr val="accent2">
-                    <a:lumMod val="20000"/>
-                    <a:lumOff val="80000"/>
-                  </a:schemeClr>
-                </a:solidFill>
-              </a:rPr>
-              <a:t>현황</a:t>
+              <a:t>앱 개발 현황</a:t>
             </a:r>
             <a:endParaRPr lang="en-US" altLang="ko-KR" b="1" dirty="0" smtClean="0">
               <a:solidFill>
@@ -4493,11 +4533,7 @@
           <a:p>
             <a:r>
               <a:rPr lang="ko-KR" altLang="en-US" dirty="0" smtClean="0"/>
-              <a:t>비즈니스 모델 </a:t>
-            </a:r>
-            <a:r>
-              <a:rPr lang="ko-KR" altLang="en-US" dirty="0" smtClean="0"/>
-              <a:t>캔버스 이미지</a:t>
+              <a:t>비즈니스 모델 캔버스 이미지</a:t>
             </a:r>
             <a:endParaRPr lang="en-US" altLang="ko-KR" dirty="0" smtClean="0"/>
           </a:p>

</xml_diff>